<commit_message>
Updated figures with labels
</commit_message>
<xml_diff>
--- a/Presentation.pptx
+++ b/Presentation.pptx
@@ -6,6 +6,10 @@
   </p:sldMasterIdLst>
   <p:sldIdLst>
     <p:sldId id="256" r:id="rId2"/>
+    <p:sldId id="257" r:id="rId3"/>
+    <p:sldId id="258" r:id="rId4"/>
+    <p:sldId id="259" r:id="rId5"/>
+    <p:sldId id="260" r:id="rId6"/>
   </p:sldIdLst>
   <p:sldSz cx="12192000" cy="6858000"/>
   <p:notesSz cx="6858000" cy="9144000"/>
@@ -104,6 +108,11 @@
       </a:defRPr>
     </a:lvl9pPr>
   </p:defaultTextStyle>
+  <p:extLst>
+    <p:ext uri="{EFAFB233-063F-42B5-8137-9DF3F51BA10A}">
+      <p15:sldGuideLst xmlns:p15="http://schemas.microsoft.com/office/powerpoint/2012/main"/>
+    </p:ext>
+  </p:extLst>
 </p:presentation>
 </file>
 
@@ -254,7 +263,7 @@
           <a:p>
             <a:fld id="{605268DD-0BB1-4344-A33E-E0EAAC7A1E72}" type="datetimeFigureOut">
               <a:rPr lang="en-US" smtClean="0"/>
-              <a:t>7/12/24</a:t>
+              <a:t>7/14/24</a:t>
             </a:fld>
             <a:endParaRPr lang="en-US"/>
           </a:p>
@@ -452,7 +461,7 @@
           <a:p>
             <a:fld id="{605268DD-0BB1-4344-A33E-E0EAAC7A1E72}" type="datetimeFigureOut">
               <a:rPr lang="en-US" smtClean="0"/>
-              <a:t>7/12/24</a:t>
+              <a:t>7/14/24</a:t>
             </a:fld>
             <a:endParaRPr lang="en-US"/>
           </a:p>
@@ -660,7 +669,7 @@
           <a:p>
             <a:fld id="{605268DD-0BB1-4344-A33E-E0EAAC7A1E72}" type="datetimeFigureOut">
               <a:rPr lang="en-US" smtClean="0"/>
-              <a:t>7/12/24</a:t>
+              <a:t>7/14/24</a:t>
             </a:fld>
             <a:endParaRPr lang="en-US"/>
           </a:p>
@@ -858,7 +867,7 @@
           <a:p>
             <a:fld id="{605268DD-0BB1-4344-A33E-E0EAAC7A1E72}" type="datetimeFigureOut">
               <a:rPr lang="en-US" smtClean="0"/>
-              <a:t>7/12/24</a:t>
+              <a:t>7/14/24</a:t>
             </a:fld>
             <a:endParaRPr lang="en-US"/>
           </a:p>
@@ -1133,7 +1142,7 @@
           <a:p>
             <a:fld id="{605268DD-0BB1-4344-A33E-E0EAAC7A1E72}" type="datetimeFigureOut">
               <a:rPr lang="en-US" smtClean="0"/>
-              <a:t>7/12/24</a:t>
+              <a:t>7/14/24</a:t>
             </a:fld>
             <a:endParaRPr lang="en-US"/>
           </a:p>
@@ -1398,7 +1407,7 @@
           <a:p>
             <a:fld id="{605268DD-0BB1-4344-A33E-E0EAAC7A1E72}" type="datetimeFigureOut">
               <a:rPr lang="en-US" smtClean="0"/>
-              <a:t>7/12/24</a:t>
+              <a:t>7/14/24</a:t>
             </a:fld>
             <a:endParaRPr lang="en-US"/>
           </a:p>
@@ -1810,7 +1819,7 @@
           <a:p>
             <a:fld id="{605268DD-0BB1-4344-A33E-E0EAAC7A1E72}" type="datetimeFigureOut">
               <a:rPr lang="en-US" smtClean="0"/>
-              <a:t>7/12/24</a:t>
+              <a:t>7/14/24</a:t>
             </a:fld>
             <a:endParaRPr lang="en-US"/>
           </a:p>
@@ -1951,7 +1960,7 @@
           <a:p>
             <a:fld id="{605268DD-0BB1-4344-A33E-E0EAAC7A1E72}" type="datetimeFigureOut">
               <a:rPr lang="en-US" smtClean="0"/>
-              <a:t>7/12/24</a:t>
+              <a:t>7/14/24</a:t>
             </a:fld>
             <a:endParaRPr lang="en-US"/>
           </a:p>
@@ -2064,7 +2073,7 @@
           <a:p>
             <a:fld id="{605268DD-0BB1-4344-A33E-E0EAAC7A1E72}" type="datetimeFigureOut">
               <a:rPr lang="en-US" smtClean="0"/>
-              <a:t>7/12/24</a:t>
+              <a:t>7/14/24</a:t>
             </a:fld>
             <a:endParaRPr lang="en-US"/>
           </a:p>
@@ -2375,7 +2384,7 @@
           <a:p>
             <a:fld id="{605268DD-0BB1-4344-A33E-E0EAAC7A1E72}" type="datetimeFigureOut">
               <a:rPr lang="en-US" smtClean="0"/>
-              <a:t>7/12/24</a:t>
+              <a:t>7/14/24</a:t>
             </a:fld>
             <a:endParaRPr lang="en-US"/>
           </a:p>
@@ -2663,7 +2672,7 @@
           <a:p>
             <a:fld id="{605268DD-0BB1-4344-A33E-E0EAAC7A1E72}" type="datetimeFigureOut">
               <a:rPr lang="en-US" smtClean="0"/>
-              <a:t>7/12/24</a:t>
+              <a:t>7/14/24</a:t>
             </a:fld>
             <a:endParaRPr lang="en-US"/>
           </a:p>
@@ -2904,7 +2913,7 @@
           <a:p>
             <a:fld id="{605268DD-0BB1-4344-A33E-E0EAAC7A1E72}" type="datetimeFigureOut">
               <a:rPr lang="en-US" smtClean="0"/>
-              <a:t>7/12/24</a:t>
+              <a:t>7/14/24</a:t>
             </a:fld>
             <a:endParaRPr lang="en-US"/>
           </a:p>
@@ -3342,7 +3351,10 @@
           <a:bodyPr/>
           <a:lstStyle/>
           <a:p>
-            <a:endParaRPr lang="en-US"/>
+            <a:r>
+              <a:rPr lang="en-US" dirty="0"/>
+              <a:t>Airplane Recommendations</a:t>
+            </a:r>
           </a:p>
         </p:txBody>
       </p:sp>
@@ -3375,6 +3387,747 @@
     <p:extLst>
       <p:ext uri="{BB962C8B-B14F-4D97-AF65-F5344CB8AC3E}">
         <p14:creationId xmlns:p14="http://schemas.microsoft.com/office/powerpoint/2010/main" val="1673821165"/>
+      </p:ext>
+    </p:extLst>
+  </p:cSld>
+  <p:clrMapOvr>
+    <a:masterClrMapping/>
+  </p:clrMapOvr>
+</p:sld>
+</file>
+
+<file path=ppt/slides/slide2.xml><?xml version="1.0" encoding="utf-8"?>
+<p:sld xmlns:a="http://schemas.openxmlformats.org/drawingml/2006/main" xmlns:r="http://schemas.openxmlformats.org/officeDocument/2006/relationships" xmlns:p="http://schemas.openxmlformats.org/presentationml/2006/main">
+  <p:cSld>
+    <p:spTree>
+      <p:nvGrpSpPr>
+        <p:cNvPr id="1" name=""/>
+        <p:cNvGrpSpPr/>
+        <p:nvPr/>
+      </p:nvGrpSpPr>
+      <p:grpSpPr>
+        <a:xfrm>
+          <a:off x="0" y="0"/>
+          <a:ext cx="0" cy="0"/>
+          <a:chOff x="0" y="0"/>
+          <a:chExt cx="0" cy="0"/>
+        </a:xfrm>
+      </p:grpSpPr>
+      <p:sp>
+        <p:nvSpPr>
+          <p:cNvPr id="2" name="Title 1">
+            <a:extLst>
+              <a:ext uri="{FF2B5EF4-FFF2-40B4-BE49-F238E27FC236}">
+                <a16:creationId xmlns:a16="http://schemas.microsoft.com/office/drawing/2014/main" id="{198DAF58-0F49-EC0A-88EE-FA635B662663}"/>
+              </a:ext>
+            </a:extLst>
+          </p:cNvPr>
+          <p:cNvSpPr>
+            <a:spLocks noGrp="1"/>
+          </p:cNvSpPr>
+          <p:nvPr>
+            <p:ph type="title"/>
+          </p:nvPr>
+        </p:nvSpPr>
+        <p:spPr/>
+        <p:txBody>
+          <a:bodyPr/>
+          <a:lstStyle/>
+          <a:p>
+            <a:r>
+              <a:rPr lang="en-US" dirty="0"/>
+              <a:t>Wide Body and Narrow Body Commercial Jets</a:t>
+            </a:r>
+          </a:p>
+        </p:txBody>
+      </p:sp>
+      <p:graphicFrame>
+        <p:nvGraphicFramePr>
+          <p:cNvPr id="5" name="Content Placeholder 4">
+            <a:extLst>
+              <a:ext uri="{FF2B5EF4-FFF2-40B4-BE49-F238E27FC236}">
+                <a16:creationId xmlns:a16="http://schemas.microsoft.com/office/drawing/2014/main" id="{36E1271D-53E4-5566-5AEC-72ADF77CDA7E}"/>
+              </a:ext>
+            </a:extLst>
+          </p:cNvPr>
+          <p:cNvGraphicFramePr>
+            <a:graphicFrameLocks noGrp="1"/>
+          </p:cNvGraphicFramePr>
+          <p:nvPr>
+            <p:ph idx="1"/>
+            <p:extLst>
+              <p:ext uri="{D42A27DB-BD31-4B8C-83A1-F6EECF244321}">
+                <p14:modId xmlns:p14="http://schemas.microsoft.com/office/powerpoint/2010/main" val="624008619"/>
+              </p:ext>
+            </p:extLst>
+          </p:nvPr>
+        </p:nvGraphicFramePr>
+        <p:xfrm>
+          <a:off x="3446435" y="1690688"/>
+          <a:ext cx="5299129" cy="4450080"/>
+        </p:xfrm>
+        <a:graphic>
+          <a:graphicData uri="http://schemas.openxmlformats.org/drawingml/2006/table">
+            <a:tbl>
+              <a:tblPr firstRow="1" bandRow="1">
+                <a:tableStyleId>{5C22544A-7EE6-4342-B048-85BDC9FD1C3A}</a:tableStyleId>
+              </a:tblPr>
+              <a:tblGrid>
+                <a:gridCol w="2555929">
+                  <a:extLst>
+                    <a:ext uri="{9D8B030D-6E8A-4147-A177-3AD203B41FA5}">
+                      <a16:colId xmlns:a16="http://schemas.microsoft.com/office/drawing/2014/main" val="2943510305"/>
+                    </a:ext>
+                  </a:extLst>
+                </a:gridCol>
+                <a:gridCol w="2743200">
+                  <a:extLst>
+                    <a:ext uri="{9D8B030D-6E8A-4147-A177-3AD203B41FA5}">
+                      <a16:colId xmlns:a16="http://schemas.microsoft.com/office/drawing/2014/main" val="256664001"/>
+                    </a:ext>
+                  </a:extLst>
+                </a:gridCol>
+              </a:tblGrid>
+              <a:tr h="370840">
+                <a:tc>
+                  <a:txBody>
+                    <a:bodyPr/>
+                    <a:lstStyle/>
+                    <a:p>
+                      <a:r>
+                        <a:rPr lang="en-US" dirty="0"/>
+                        <a:t>Make</a:t>
+                      </a:r>
+                    </a:p>
+                  </a:txBody>
+                  <a:tcPr/>
+                </a:tc>
+                <a:tc>
+                  <a:txBody>
+                    <a:bodyPr/>
+                    <a:lstStyle/>
+                    <a:p>
+                      <a:r>
+                        <a:rPr lang="en-US" dirty="0"/>
+                        <a:t>Model</a:t>
+                      </a:r>
+                    </a:p>
+                  </a:txBody>
+                  <a:tcPr/>
+                </a:tc>
+                <a:extLst>
+                  <a:ext uri="{0D108BD9-81ED-4DB2-BD59-A6C34878D82A}">
+                    <a16:rowId xmlns:a16="http://schemas.microsoft.com/office/drawing/2014/main" val="2265805981"/>
+                  </a:ext>
+                </a:extLst>
+              </a:tr>
+              <a:tr h="370840">
+                <a:tc rowSpan="7">
+                  <a:txBody>
+                    <a:bodyPr/>
+                    <a:lstStyle/>
+                    <a:p>
+                      <a:r>
+                        <a:rPr lang="en-US" dirty="0"/>
+                        <a:t>Airbus</a:t>
+                      </a:r>
+                    </a:p>
+                  </a:txBody>
+                  <a:tcPr/>
+                </a:tc>
+                <a:tc>
+                  <a:txBody>
+                    <a:bodyPr/>
+                    <a:lstStyle/>
+                    <a:p>
+                      <a:r>
+                        <a:rPr lang="en-US" dirty="0"/>
+                        <a:t>A220</a:t>
+                      </a:r>
+                    </a:p>
+                  </a:txBody>
+                  <a:tcPr/>
+                </a:tc>
+                <a:extLst>
+                  <a:ext uri="{0D108BD9-81ED-4DB2-BD59-A6C34878D82A}">
+                    <a16:rowId xmlns:a16="http://schemas.microsoft.com/office/drawing/2014/main" val="2325156028"/>
+                  </a:ext>
+                </a:extLst>
+              </a:tr>
+              <a:tr h="370840">
+                <a:tc vMerge="1">
+                  <a:txBody>
+                    <a:bodyPr/>
+                    <a:lstStyle/>
+                    <a:p>
+                      <a:endParaRPr lang="en-US" dirty="0"/>
+                    </a:p>
+                  </a:txBody>
+                  <a:tcPr/>
+                </a:tc>
+                <a:tc>
+                  <a:txBody>
+                    <a:bodyPr/>
+                    <a:lstStyle/>
+                    <a:p>
+                      <a:r>
+                        <a:rPr lang="en-US" dirty="0"/>
+                        <a:t>A319</a:t>
+                      </a:r>
+                    </a:p>
+                  </a:txBody>
+                  <a:tcPr/>
+                </a:tc>
+                <a:extLst>
+                  <a:ext uri="{0D108BD9-81ED-4DB2-BD59-A6C34878D82A}">
+                    <a16:rowId xmlns:a16="http://schemas.microsoft.com/office/drawing/2014/main" val="3283752515"/>
+                  </a:ext>
+                </a:extLst>
+              </a:tr>
+              <a:tr h="370840">
+                <a:tc vMerge="1">
+                  <a:txBody>
+                    <a:bodyPr/>
+                    <a:lstStyle/>
+                    <a:p>
+                      <a:endParaRPr lang="en-US" dirty="0"/>
+                    </a:p>
+                  </a:txBody>
+                  <a:tcPr/>
+                </a:tc>
+                <a:tc>
+                  <a:txBody>
+                    <a:bodyPr/>
+                    <a:lstStyle/>
+                    <a:p>
+                      <a:r>
+                        <a:rPr lang="en-US" dirty="0"/>
+                        <a:t>A320</a:t>
+                      </a:r>
+                    </a:p>
+                  </a:txBody>
+                  <a:tcPr/>
+                </a:tc>
+                <a:extLst>
+                  <a:ext uri="{0D108BD9-81ED-4DB2-BD59-A6C34878D82A}">
+                    <a16:rowId xmlns:a16="http://schemas.microsoft.com/office/drawing/2014/main" val="2536173381"/>
+                  </a:ext>
+                </a:extLst>
+              </a:tr>
+              <a:tr h="370840">
+                <a:tc vMerge="1">
+                  <a:txBody>
+                    <a:bodyPr/>
+                    <a:lstStyle/>
+                    <a:p>
+                      <a:endParaRPr lang="en-US" dirty="0"/>
+                    </a:p>
+                  </a:txBody>
+                  <a:tcPr/>
+                </a:tc>
+                <a:tc>
+                  <a:txBody>
+                    <a:bodyPr/>
+                    <a:lstStyle/>
+                    <a:p>
+                      <a:r>
+                        <a:rPr lang="en-US" dirty="0"/>
+                        <a:t>A321</a:t>
+                      </a:r>
+                    </a:p>
+                  </a:txBody>
+                  <a:tcPr/>
+                </a:tc>
+                <a:extLst>
+                  <a:ext uri="{0D108BD9-81ED-4DB2-BD59-A6C34878D82A}">
+                    <a16:rowId xmlns:a16="http://schemas.microsoft.com/office/drawing/2014/main" val="4093521471"/>
+                  </a:ext>
+                </a:extLst>
+              </a:tr>
+              <a:tr h="370840">
+                <a:tc vMerge="1">
+                  <a:txBody>
+                    <a:bodyPr/>
+                    <a:lstStyle/>
+                    <a:p>
+                      <a:endParaRPr lang="en-US" dirty="0"/>
+                    </a:p>
+                  </a:txBody>
+                  <a:tcPr/>
+                </a:tc>
+                <a:tc>
+                  <a:txBody>
+                    <a:bodyPr/>
+                    <a:lstStyle/>
+                    <a:p>
+                      <a:r>
+                        <a:rPr lang="en-US" dirty="0"/>
+                        <a:t>A330</a:t>
+                      </a:r>
+                    </a:p>
+                  </a:txBody>
+                  <a:tcPr/>
+                </a:tc>
+                <a:extLst>
+                  <a:ext uri="{0D108BD9-81ED-4DB2-BD59-A6C34878D82A}">
+                    <a16:rowId xmlns:a16="http://schemas.microsoft.com/office/drawing/2014/main" val="705429294"/>
+                  </a:ext>
+                </a:extLst>
+              </a:tr>
+              <a:tr h="370840">
+                <a:tc vMerge="1">
+                  <a:txBody>
+                    <a:bodyPr/>
+                    <a:lstStyle/>
+                    <a:p>
+                      <a:endParaRPr lang="en-US" dirty="0"/>
+                    </a:p>
+                  </a:txBody>
+                  <a:tcPr/>
+                </a:tc>
+                <a:tc>
+                  <a:txBody>
+                    <a:bodyPr/>
+                    <a:lstStyle/>
+                    <a:p>
+                      <a:r>
+                        <a:rPr lang="en-US" dirty="0"/>
+                        <a:t>A340</a:t>
+                      </a:r>
+                    </a:p>
+                  </a:txBody>
+                  <a:tcPr/>
+                </a:tc>
+                <a:extLst>
+                  <a:ext uri="{0D108BD9-81ED-4DB2-BD59-A6C34878D82A}">
+                    <a16:rowId xmlns:a16="http://schemas.microsoft.com/office/drawing/2014/main" val="287157171"/>
+                  </a:ext>
+                </a:extLst>
+              </a:tr>
+              <a:tr h="370840">
+                <a:tc vMerge="1">
+                  <a:txBody>
+                    <a:bodyPr/>
+                    <a:lstStyle/>
+                    <a:p>
+                      <a:endParaRPr lang="en-US" dirty="0"/>
+                    </a:p>
+                  </a:txBody>
+                  <a:tcPr/>
+                </a:tc>
+                <a:tc>
+                  <a:txBody>
+                    <a:bodyPr/>
+                    <a:lstStyle/>
+                    <a:p>
+                      <a:r>
+                        <a:rPr lang="en-US" dirty="0"/>
+                        <a:t>A350</a:t>
+                      </a:r>
+                    </a:p>
+                  </a:txBody>
+                  <a:tcPr/>
+                </a:tc>
+                <a:extLst>
+                  <a:ext uri="{0D108BD9-81ED-4DB2-BD59-A6C34878D82A}">
+                    <a16:rowId xmlns:a16="http://schemas.microsoft.com/office/drawing/2014/main" val="2032527853"/>
+                  </a:ext>
+                </a:extLst>
+              </a:tr>
+              <a:tr h="370840">
+                <a:tc rowSpan="4">
+                  <a:txBody>
+                    <a:bodyPr/>
+                    <a:lstStyle/>
+                    <a:p>
+                      <a:r>
+                        <a:rPr lang="en-US" dirty="0"/>
+                        <a:t>Boeing</a:t>
+                      </a:r>
+                    </a:p>
+                  </a:txBody>
+                  <a:tcPr/>
+                </a:tc>
+                <a:tc>
+                  <a:txBody>
+                    <a:bodyPr/>
+                    <a:lstStyle/>
+                    <a:p>
+                      <a:r>
+                        <a:rPr lang="en-US" dirty="0"/>
+                        <a:t>737</a:t>
+                      </a:r>
+                    </a:p>
+                  </a:txBody>
+                  <a:tcPr/>
+                </a:tc>
+                <a:extLst>
+                  <a:ext uri="{0D108BD9-81ED-4DB2-BD59-A6C34878D82A}">
+                    <a16:rowId xmlns:a16="http://schemas.microsoft.com/office/drawing/2014/main" val="1406832263"/>
+                  </a:ext>
+                </a:extLst>
+              </a:tr>
+              <a:tr h="370840">
+                <a:tc vMerge="1">
+                  <a:txBody>
+                    <a:bodyPr/>
+                    <a:lstStyle/>
+                    <a:p>
+                      <a:endParaRPr lang="en-US" dirty="0"/>
+                    </a:p>
+                  </a:txBody>
+                  <a:tcPr/>
+                </a:tc>
+                <a:tc>
+                  <a:txBody>
+                    <a:bodyPr/>
+                    <a:lstStyle/>
+                    <a:p>
+                      <a:r>
+                        <a:rPr lang="en-US" dirty="0"/>
+                        <a:t>767</a:t>
+                      </a:r>
+                    </a:p>
+                  </a:txBody>
+                  <a:tcPr/>
+                </a:tc>
+                <a:extLst>
+                  <a:ext uri="{0D108BD9-81ED-4DB2-BD59-A6C34878D82A}">
+                    <a16:rowId xmlns:a16="http://schemas.microsoft.com/office/drawing/2014/main" val="652601849"/>
+                  </a:ext>
+                </a:extLst>
+              </a:tr>
+              <a:tr h="370840">
+                <a:tc vMerge="1">
+                  <a:txBody>
+                    <a:bodyPr/>
+                    <a:lstStyle/>
+                    <a:p>
+                      <a:endParaRPr lang="en-US" dirty="0"/>
+                    </a:p>
+                  </a:txBody>
+                  <a:tcPr/>
+                </a:tc>
+                <a:tc>
+                  <a:txBody>
+                    <a:bodyPr/>
+                    <a:lstStyle/>
+                    <a:p>
+                      <a:r>
+                        <a:rPr lang="en-US" dirty="0"/>
+                        <a:t>777</a:t>
+                      </a:r>
+                    </a:p>
+                  </a:txBody>
+                  <a:tcPr/>
+                </a:tc>
+                <a:extLst>
+                  <a:ext uri="{0D108BD9-81ED-4DB2-BD59-A6C34878D82A}">
+                    <a16:rowId xmlns:a16="http://schemas.microsoft.com/office/drawing/2014/main" val="2948297894"/>
+                  </a:ext>
+                </a:extLst>
+              </a:tr>
+              <a:tr h="370840">
+                <a:tc vMerge="1">
+                  <a:txBody>
+                    <a:bodyPr/>
+                    <a:lstStyle/>
+                    <a:p>
+                      <a:endParaRPr lang="en-US" dirty="0"/>
+                    </a:p>
+                  </a:txBody>
+                  <a:tcPr/>
+                </a:tc>
+                <a:tc>
+                  <a:txBody>
+                    <a:bodyPr/>
+                    <a:lstStyle/>
+                    <a:p>
+                      <a:r>
+                        <a:rPr lang="en-US" dirty="0"/>
+                        <a:t>787</a:t>
+                      </a:r>
+                    </a:p>
+                  </a:txBody>
+                  <a:tcPr/>
+                </a:tc>
+                <a:extLst>
+                  <a:ext uri="{0D108BD9-81ED-4DB2-BD59-A6C34878D82A}">
+                    <a16:rowId xmlns:a16="http://schemas.microsoft.com/office/drawing/2014/main" val="2337482110"/>
+                  </a:ext>
+                </a:extLst>
+              </a:tr>
+            </a:tbl>
+          </a:graphicData>
+        </a:graphic>
+      </p:graphicFrame>
+    </p:spTree>
+    <p:extLst>
+      <p:ext uri="{BB962C8B-B14F-4D97-AF65-F5344CB8AC3E}">
+        <p14:creationId xmlns:p14="http://schemas.microsoft.com/office/powerpoint/2010/main" val="1424778419"/>
+      </p:ext>
+    </p:extLst>
+  </p:cSld>
+  <p:clrMapOvr>
+    <a:masterClrMapping/>
+  </p:clrMapOvr>
+</p:sld>
+</file>
+
+<file path=ppt/slides/slide3.xml><?xml version="1.0" encoding="utf-8"?>
+<p:sld xmlns:a="http://schemas.openxmlformats.org/drawingml/2006/main" xmlns:r="http://schemas.openxmlformats.org/officeDocument/2006/relationships" xmlns:p="http://schemas.openxmlformats.org/presentationml/2006/main">
+  <p:cSld>
+    <p:spTree>
+      <p:nvGrpSpPr>
+        <p:cNvPr id="1" name=""/>
+        <p:cNvGrpSpPr/>
+        <p:nvPr/>
+      </p:nvGrpSpPr>
+      <p:grpSpPr>
+        <a:xfrm>
+          <a:off x="0" y="0"/>
+          <a:ext cx="0" cy="0"/>
+          <a:chOff x="0" y="0"/>
+          <a:chExt cx="0" cy="0"/>
+        </a:xfrm>
+      </p:grpSpPr>
+      <p:sp>
+        <p:nvSpPr>
+          <p:cNvPr id="2" name="Title 1">
+            <a:extLst>
+              <a:ext uri="{FF2B5EF4-FFF2-40B4-BE49-F238E27FC236}">
+                <a16:creationId xmlns:a16="http://schemas.microsoft.com/office/drawing/2014/main" id="{A6B4CDE3-42E3-7022-F9C8-463C5CBC9989}"/>
+              </a:ext>
+            </a:extLst>
+          </p:cNvPr>
+          <p:cNvSpPr>
+            <a:spLocks noGrp="1"/>
+          </p:cNvSpPr>
+          <p:nvPr>
+            <p:ph type="title"/>
+          </p:nvPr>
+        </p:nvSpPr>
+        <p:spPr/>
+        <p:txBody>
+          <a:bodyPr/>
+          <a:lstStyle/>
+          <a:p>
+            <a:r>
+              <a:rPr lang="en-US" dirty="0"/>
+              <a:t>NTSB Incident Investigations</a:t>
+            </a:r>
+          </a:p>
+        </p:txBody>
+      </p:sp>
+      <p:pic>
+        <p:nvPicPr>
+          <p:cNvPr id="4" name="Picture 3" descr="A screenshot of a computer&#10;&#10;Description automatically generated">
+            <a:extLst>
+              <a:ext uri="{FF2B5EF4-FFF2-40B4-BE49-F238E27FC236}">
+                <a16:creationId xmlns:a16="http://schemas.microsoft.com/office/drawing/2014/main" id="{6344D5FB-0775-FDBF-795D-8743490D0C34}"/>
+              </a:ext>
+            </a:extLst>
+          </p:cNvPr>
+          <p:cNvPicPr>
+            <a:picLocks noChangeAspect="1"/>
+          </p:cNvPicPr>
+          <p:nvPr/>
+        </p:nvPicPr>
+        <p:blipFill rotWithShape="1">
+          <a:blip r:embed="rId2"/>
+          <a:srcRect l="23636" t="42226" r="26762" b="15549"/>
+          <a:stretch/>
+        </p:blipFill>
+        <p:spPr>
+          <a:xfrm>
+            <a:off x="1062681" y="1377779"/>
+            <a:ext cx="9613918" cy="5115096"/>
+          </a:xfrm>
+          <a:prstGeom prst="rect">
+            <a:avLst/>
+          </a:prstGeom>
+        </p:spPr>
+      </p:pic>
+    </p:spTree>
+    <p:extLst>
+      <p:ext uri="{BB962C8B-B14F-4D97-AF65-F5344CB8AC3E}">
+        <p14:creationId xmlns:p14="http://schemas.microsoft.com/office/powerpoint/2010/main" val="2103938566"/>
+      </p:ext>
+    </p:extLst>
+  </p:cSld>
+  <p:clrMapOvr>
+    <a:masterClrMapping/>
+  </p:clrMapOvr>
+</p:sld>
+</file>
+
+<file path=ppt/slides/slide4.xml><?xml version="1.0" encoding="utf-8"?>
+<p:sld xmlns:a="http://schemas.openxmlformats.org/drawingml/2006/main" xmlns:r="http://schemas.openxmlformats.org/officeDocument/2006/relationships" xmlns:p="http://schemas.openxmlformats.org/presentationml/2006/main">
+  <p:cSld>
+    <p:spTree>
+      <p:nvGrpSpPr>
+        <p:cNvPr id="1" name=""/>
+        <p:cNvGrpSpPr/>
+        <p:nvPr/>
+      </p:nvGrpSpPr>
+      <p:grpSpPr>
+        <a:xfrm>
+          <a:off x="0" y="0"/>
+          <a:ext cx="0" cy="0"/>
+          <a:chOff x="0" y="0"/>
+          <a:chExt cx="0" cy="0"/>
+        </a:xfrm>
+      </p:grpSpPr>
+      <p:sp>
+        <p:nvSpPr>
+          <p:cNvPr id="2" name="Title 1">
+            <a:extLst>
+              <a:ext uri="{FF2B5EF4-FFF2-40B4-BE49-F238E27FC236}">
+                <a16:creationId xmlns:a16="http://schemas.microsoft.com/office/drawing/2014/main" id="{A6B4CDE3-42E3-7022-F9C8-463C5CBC9989}"/>
+              </a:ext>
+            </a:extLst>
+          </p:cNvPr>
+          <p:cNvSpPr>
+            <a:spLocks noGrp="1"/>
+          </p:cNvSpPr>
+          <p:nvPr>
+            <p:ph type="title"/>
+          </p:nvPr>
+        </p:nvSpPr>
+        <p:spPr/>
+        <p:txBody>
+          <a:bodyPr/>
+          <a:lstStyle/>
+          <a:p>
+            <a:r>
+              <a:rPr lang="en-US" dirty="0"/>
+              <a:t>Visualizations</a:t>
+            </a:r>
+          </a:p>
+        </p:txBody>
+      </p:sp>
+      <p:pic>
+        <p:nvPicPr>
+          <p:cNvPr id="5" name="Picture 4" descr="A graph with red and blue bars&#10;&#10;Description automatically generated">
+            <a:extLst>
+              <a:ext uri="{FF2B5EF4-FFF2-40B4-BE49-F238E27FC236}">
+                <a16:creationId xmlns:a16="http://schemas.microsoft.com/office/drawing/2014/main" id="{DC16E4F3-1F12-4546-CA72-A9F5022B5B74}"/>
+              </a:ext>
+            </a:extLst>
+          </p:cNvPr>
+          <p:cNvPicPr>
+            <a:picLocks noChangeAspect="1"/>
+          </p:cNvPicPr>
+          <p:nvPr/>
+        </p:nvPicPr>
+        <p:blipFill>
+          <a:blip r:embed="rId2"/>
+          <a:stretch>
+            <a:fillRect/>
+          </a:stretch>
+        </p:blipFill>
+        <p:spPr>
+          <a:xfrm>
+            <a:off x="2454564" y="968086"/>
+            <a:ext cx="7853218" cy="5889914"/>
+          </a:xfrm>
+          <a:prstGeom prst="rect">
+            <a:avLst/>
+          </a:prstGeom>
+        </p:spPr>
+      </p:pic>
+    </p:spTree>
+    <p:extLst>
+      <p:ext uri="{BB962C8B-B14F-4D97-AF65-F5344CB8AC3E}">
+        <p14:creationId xmlns:p14="http://schemas.microsoft.com/office/powerpoint/2010/main" val="1038840234"/>
+      </p:ext>
+    </p:extLst>
+  </p:cSld>
+  <p:clrMapOvr>
+    <a:masterClrMapping/>
+  </p:clrMapOvr>
+</p:sld>
+</file>
+
+<file path=ppt/slides/slide5.xml><?xml version="1.0" encoding="utf-8"?>
+<p:sld xmlns:a="http://schemas.openxmlformats.org/drawingml/2006/main" xmlns:r="http://schemas.openxmlformats.org/officeDocument/2006/relationships" xmlns:p="http://schemas.openxmlformats.org/presentationml/2006/main">
+  <p:cSld>
+    <p:spTree>
+      <p:nvGrpSpPr>
+        <p:cNvPr id="1" name=""/>
+        <p:cNvGrpSpPr/>
+        <p:nvPr/>
+      </p:nvGrpSpPr>
+      <p:grpSpPr>
+        <a:xfrm>
+          <a:off x="0" y="0"/>
+          <a:ext cx="0" cy="0"/>
+          <a:chOff x="0" y="0"/>
+          <a:chExt cx="0" cy="0"/>
+        </a:xfrm>
+      </p:grpSpPr>
+      <p:sp>
+        <p:nvSpPr>
+          <p:cNvPr id="2" name="Title 1">
+            <a:extLst>
+              <a:ext uri="{FF2B5EF4-FFF2-40B4-BE49-F238E27FC236}">
+                <a16:creationId xmlns:a16="http://schemas.microsoft.com/office/drawing/2014/main" id="{A6B4CDE3-42E3-7022-F9C8-463C5CBC9989}"/>
+              </a:ext>
+            </a:extLst>
+          </p:cNvPr>
+          <p:cNvSpPr>
+            <a:spLocks noGrp="1"/>
+          </p:cNvSpPr>
+          <p:nvPr>
+            <p:ph type="title"/>
+          </p:nvPr>
+        </p:nvSpPr>
+        <p:spPr/>
+        <p:txBody>
+          <a:bodyPr/>
+          <a:lstStyle/>
+          <a:p>
+            <a:r>
+              <a:rPr lang="en-US" dirty="0"/>
+              <a:t>Ratio</a:t>
+            </a:r>
+          </a:p>
+        </p:txBody>
+      </p:sp>
+      <p:pic>
+        <p:nvPicPr>
+          <p:cNvPr id="5" name="Picture 4" descr="A graph with text on it&#10;&#10;Description automatically generated">
+            <a:extLst>
+              <a:ext uri="{FF2B5EF4-FFF2-40B4-BE49-F238E27FC236}">
+                <a16:creationId xmlns:a16="http://schemas.microsoft.com/office/drawing/2014/main" id="{C25BA25A-DB4B-AB6B-BB03-37A3DDC16E43}"/>
+              </a:ext>
+            </a:extLst>
+          </p:cNvPr>
+          <p:cNvPicPr>
+            <a:picLocks noChangeAspect="1"/>
+          </p:cNvPicPr>
+          <p:nvPr/>
+        </p:nvPicPr>
+        <p:blipFill>
+          <a:blip r:embed="rId2"/>
+          <a:stretch>
+            <a:fillRect/>
+          </a:stretch>
+        </p:blipFill>
+        <p:spPr>
+          <a:xfrm>
+            <a:off x="2349500" y="1027906"/>
+            <a:ext cx="7493000" cy="5619750"/>
+          </a:xfrm>
+          <a:prstGeom prst="rect">
+            <a:avLst/>
+          </a:prstGeom>
+        </p:spPr>
+      </p:pic>
+    </p:spTree>
+    <p:extLst>
+      <p:ext uri="{BB962C8B-B14F-4D97-AF65-F5344CB8AC3E}">
+        <p14:creationId xmlns:p14="http://schemas.microsoft.com/office/powerpoint/2010/main" val="1428409811"/>
       </p:ext>
     </p:extLst>
   </p:cSld>

</xml_diff>

<commit_message>
updated presentation with images
</commit_message>
<xml_diff>
--- a/Presentation.pptx
+++ b/Presentation.pptx
@@ -263,7 +263,7 @@
           <a:p>
             <a:fld id="{605268DD-0BB1-4344-A33E-E0EAAC7A1E72}" type="datetimeFigureOut">
               <a:rPr lang="en-US" smtClean="0"/>
-              <a:t>7/14/24</a:t>
+              <a:t>7/15/24</a:t>
             </a:fld>
             <a:endParaRPr lang="en-US"/>
           </a:p>
@@ -461,7 +461,7 @@
           <a:p>
             <a:fld id="{605268DD-0BB1-4344-A33E-E0EAAC7A1E72}" type="datetimeFigureOut">
               <a:rPr lang="en-US" smtClean="0"/>
-              <a:t>7/14/24</a:t>
+              <a:t>7/15/24</a:t>
             </a:fld>
             <a:endParaRPr lang="en-US"/>
           </a:p>
@@ -669,7 +669,7 @@
           <a:p>
             <a:fld id="{605268DD-0BB1-4344-A33E-E0EAAC7A1E72}" type="datetimeFigureOut">
               <a:rPr lang="en-US" smtClean="0"/>
-              <a:t>7/14/24</a:t>
+              <a:t>7/15/24</a:t>
             </a:fld>
             <a:endParaRPr lang="en-US"/>
           </a:p>
@@ -867,7 +867,7 @@
           <a:p>
             <a:fld id="{605268DD-0BB1-4344-A33E-E0EAAC7A1E72}" type="datetimeFigureOut">
               <a:rPr lang="en-US" smtClean="0"/>
-              <a:t>7/14/24</a:t>
+              <a:t>7/15/24</a:t>
             </a:fld>
             <a:endParaRPr lang="en-US"/>
           </a:p>
@@ -1142,7 +1142,7 @@
           <a:p>
             <a:fld id="{605268DD-0BB1-4344-A33E-E0EAAC7A1E72}" type="datetimeFigureOut">
               <a:rPr lang="en-US" smtClean="0"/>
-              <a:t>7/14/24</a:t>
+              <a:t>7/15/24</a:t>
             </a:fld>
             <a:endParaRPr lang="en-US"/>
           </a:p>
@@ -1407,7 +1407,7 @@
           <a:p>
             <a:fld id="{605268DD-0BB1-4344-A33E-E0EAAC7A1E72}" type="datetimeFigureOut">
               <a:rPr lang="en-US" smtClean="0"/>
-              <a:t>7/14/24</a:t>
+              <a:t>7/15/24</a:t>
             </a:fld>
             <a:endParaRPr lang="en-US"/>
           </a:p>
@@ -1819,7 +1819,7 @@
           <a:p>
             <a:fld id="{605268DD-0BB1-4344-A33E-E0EAAC7A1E72}" type="datetimeFigureOut">
               <a:rPr lang="en-US" smtClean="0"/>
-              <a:t>7/14/24</a:t>
+              <a:t>7/15/24</a:t>
             </a:fld>
             <a:endParaRPr lang="en-US"/>
           </a:p>
@@ -1960,7 +1960,7 @@
           <a:p>
             <a:fld id="{605268DD-0BB1-4344-A33E-E0EAAC7A1E72}" type="datetimeFigureOut">
               <a:rPr lang="en-US" smtClean="0"/>
-              <a:t>7/14/24</a:t>
+              <a:t>7/15/24</a:t>
             </a:fld>
             <a:endParaRPr lang="en-US"/>
           </a:p>
@@ -2073,7 +2073,7 @@
           <a:p>
             <a:fld id="{605268DD-0BB1-4344-A33E-E0EAAC7A1E72}" type="datetimeFigureOut">
               <a:rPr lang="en-US" smtClean="0"/>
-              <a:t>7/14/24</a:t>
+              <a:t>7/15/24</a:t>
             </a:fld>
             <a:endParaRPr lang="en-US"/>
           </a:p>
@@ -2384,7 +2384,7 @@
           <a:p>
             <a:fld id="{605268DD-0BB1-4344-A33E-E0EAAC7A1E72}" type="datetimeFigureOut">
               <a:rPr lang="en-US" smtClean="0"/>
-              <a:t>7/14/24</a:t>
+              <a:t>7/15/24</a:t>
             </a:fld>
             <a:endParaRPr lang="en-US"/>
           </a:p>
@@ -2672,7 +2672,7 @@
           <a:p>
             <a:fld id="{605268DD-0BB1-4344-A33E-E0EAAC7A1E72}" type="datetimeFigureOut">
               <a:rPr lang="en-US" smtClean="0"/>
-              <a:t>7/14/24</a:t>
+              <a:t>7/15/24</a:t>
             </a:fld>
             <a:endParaRPr lang="en-US"/>
           </a:p>
@@ -2913,7 +2913,7 @@
           <a:p>
             <a:fld id="{605268DD-0BB1-4344-A33E-E0EAAC7A1E72}" type="datetimeFigureOut">
               <a:rPr lang="en-US" smtClean="0"/>
-              <a:t>7/14/24</a:t>
+              <a:t>7/15/24</a:t>
             </a:fld>
             <a:endParaRPr lang="en-US"/>
           </a:p>
@@ -3978,40 +3978,12 @@
           <a:chExt cx="0" cy="0"/>
         </a:xfrm>
       </p:grpSpPr>
-      <p:sp>
-        <p:nvSpPr>
-          <p:cNvPr id="2" name="Title 1">
-            <a:extLst>
-              <a:ext uri="{FF2B5EF4-FFF2-40B4-BE49-F238E27FC236}">
-                <a16:creationId xmlns:a16="http://schemas.microsoft.com/office/drawing/2014/main" id="{A6B4CDE3-42E3-7022-F9C8-463C5CBC9989}"/>
-              </a:ext>
-            </a:extLst>
-          </p:cNvPr>
-          <p:cNvSpPr>
-            <a:spLocks noGrp="1"/>
-          </p:cNvSpPr>
-          <p:nvPr>
-            <p:ph type="title"/>
-          </p:nvPr>
-        </p:nvSpPr>
-        <p:spPr/>
-        <p:txBody>
-          <a:bodyPr/>
-          <a:lstStyle/>
-          <a:p>
-            <a:r>
-              <a:rPr lang="en-US" dirty="0"/>
-              <a:t>Visualizations</a:t>
-            </a:r>
-          </a:p>
-        </p:txBody>
-      </p:sp>
       <p:pic>
         <p:nvPicPr>
-          <p:cNvPr id="5" name="Picture 4" descr="A graph with red and blue bars&#10;&#10;Description automatically generated">
-            <a:extLst>
-              <a:ext uri="{FF2B5EF4-FFF2-40B4-BE49-F238E27FC236}">
-                <a16:creationId xmlns:a16="http://schemas.microsoft.com/office/drawing/2014/main" id="{DC16E4F3-1F12-4546-CA72-A9F5022B5B74}"/>
+          <p:cNvPr id="7" name="Picture 6" descr="A graph of accident type by a model&#10;&#10;Description automatically generated">
+            <a:extLst>
+              <a:ext uri="{FF2B5EF4-FFF2-40B4-BE49-F238E27FC236}">
+                <a16:creationId xmlns:a16="http://schemas.microsoft.com/office/drawing/2014/main" id="{771D2541-7117-6187-5F16-04CFAA1A59ED}"/>
               </a:ext>
             </a:extLst>
           </p:cNvPr>
@@ -4028,14 +4000,47 @@
         </p:blipFill>
         <p:spPr>
           <a:xfrm>
-            <a:off x="2454564" y="968086"/>
-            <a:ext cx="7853218" cy="5889914"/>
+            <a:off x="2501901" y="982471"/>
+            <a:ext cx="6887426" cy="5875529"/>
           </a:xfrm>
           <a:prstGeom prst="rect">
             <a:avLst/>
           </a:prstGeom>
         </p:spPr>
       </p:pic>
+      <p:sp>
+        <p:nvSpPr>
+          <p:cNvPr id="2" name="Title 1">
+            <a:extLst>
+              <a:ext uri="{FF2B5EF4-FFF2-40B4-BE49-F238E27FC236}">
+                <a16:creationId xmlns:a16="http://schemas.microsoft.com/office/drawing/2014/main" id="{A6B4CDE3-42E3-7022-F9C8-463C5CBC9989}"/>
+              </a:ext>
+            </a:extLst>
+          </p:cNvPr>
+          <p:cNvSpPr>
+            <a:spLocks noGrp="1"/>
+          </p:cNvSpPr>
+          <p:nvPr>
+            <p:ph type="title"/>
+          </p:nvPr>
+        </p:nvSpPr>
+        <p:spPr>
+          <a:xfrm>
+            <a:off x="553999" y="186705"/>
+            <a:ext cx="10515600" cy="1325563"/>
+          </a:xfrm>
+        </p:spPr>
+        <p:txBody>
+          <a:bodyPr/>
+          <a:lstStyle/>
+          <a:p>
+            <a:r>
+              <a:rPr lang="en-US" dirty="0"/>
+              <a:t>Wide-Body Airplanes</a:t>
+            </a:r>
+          </a:p>
+        </p:txBody>
+      </p:sp>
     </p:spTree>
     <p:extLst>
       <p:ext uri="{BB962C8B-B14F-4D97-AF65-F5344CB8AC3E}">

</xml_diff>

<commit_message>
Updated Presentation with Narrow-Body and Business Jet Visualizations
</commit_message>
<xml_diff>
--- a/Presentation.pptx
+++ b/Presentation.pptx
@@ -7,9 +7,12 @@
   <p:sldIdLst>
     <p:sldId id="256" r:id="rId2"/>
     <p:sldId id="257" r:id="rId3"/>
-    <p:sldId id="258" r:id="rId4"/>
-    <p:sldId id="259" r:id="rId5"/>
-    <p:sldId id="260" r:id="rId6"/>
+    <p:sldId id="261" r:id="rId4"/>
+    <p:sldId id="262" r:id="rId5"/>
+    <p:sldId id="259" r:id="rId6"/>
+    <p:sldId id="263" r:id="rId7"/>
+    <p:sldId id="264" r:id="rId8"/>
+    <p:sldId id="265" r:id="rId9"/>
   </p:sldIdLst>
   <p:sldSz cx="12192000" cy="6858000"/>
   <p:notesSz cx="6858000" cy="9144000"/>
@@ -3353,7 +3356,7 @@
           <a:p>
             <a:r>
               <a:rPr lang="en-US" dirty="0"/>
-              <a:t>Airplane Recommendations</a:t>
+              <a:t>NTSB Accident Review</a:t>
             </a:r>
           </a:p>
         </p:txBody>
@@ -3896,7 +3899,7 @@
           <p:cNvPr id="2" name="Title 1">
             <a:extLst>
               <a:ext uri="{FF2B5EF4-FFF2-40B4-BE49-F238E27FC236}">
-                <a16:creationId xmlns:a16="http://schemas.microsoft.com/office/drawing/2014/main" id="{A6B4CDE3-42E3-7022-F9C8-463C5CBC9989}"/>
+                <a16:creationId xmlns:a16="http://schemas.microsoft.com/office/drawing/2014/main" id="{EE643E34-E922-E8C2-7746-A63929EE2FFA}"/>
               </a:ext>
             </a:extLst>
           </p:cNvPr>
@@ -3907,24 +3910,29 @@
             <p:ph type="title"/>
           </p:nvPr>
         </p:nvSpPr>
-        <p:spPr/>
+        <p:spPr>
+          <a:xfrm>
+            <a:off x="838200" y="231313"/>
+            <a:ext cx="10515600" cy="1325563"/>
+          </a:xfrm>
+        </p:spPr>
         <p:txBody>
           <a:bodyPr/>
           <a:lstStyle/>
           <a:p>
             <a:r>
               <a:rPr lang="en-US" dirty="0"/>
-              <a:t>NTSB Incident Investigations</a:t>
+              <a:t>Total Accidents by Year</a:t>
             </a:r>
           </a:p>
         </p:txBody>
       </p:sp>
       <p:pic>
         <p:nvPicPr>
-          <p:cNvPr id="4" name="Picture 3" descr="A screenshot of a computer&#10;&#10;Description automatically generated">
-            <a:extLst>
-              <a:ext uri="{FF2B5EF4-FFF2-40B4-BE49-F238E27FC236}">
-                <a16:creationId xmlns:a16="http://schemas.microsoft.com/office/drawing/2014/main" id="{6344D5FB-0775-FDBF-795D-8743490D0C34}"/>
+          <p:cNvPr id="9" name="Picture 8" descr="A graph of a number of years&#10;&#10;Description automatically generated">
+            <a:extLst>
+              <a:ext uri="{FF2B5EF4-FFF2-40B4-BE49-F238E27FC236}">
+                <a16:creationId xmlns:a16="http://schemas.microsoft.com/office/drawing/2014/main" id="{9A2BFD20-F6D9-4E74-DCC8-474C92FF700F}"/>
               </a:ext>
             </a:extLst>
           </p:cNvPr>
@@ -3933,15 +3941,16 @@
           </p:cNvPicPr>
           <p:nvPr/>
         </p:nvPicPr>
-        <p:blipFill rotWithShape="1">
+        <p:blipFill>
           <a:blip r:embed="rId2"/>
-          <a:srcRect l="23636" t="42226" r="26762" b="15549"/>
-          <a:stretch/>
+          <a:stretch>
+            <a:fillRect/>
+          </a:stretch>
         </p:blipFill>
         <p:spPr>
           <a:xfrm>
-            <a:off x="1062681" y="1377779"/>
-            <a:ext cx="9613918" cy="5115096"/>
+            <a:off x="2164030" y="1081211"/>
+            <a:ext cx="7225297" cy="5776789"/>
           </a:xfrm>
           <a:prstGeom prst="rect">
             <a:avLst/>
@@ -3951,7 +3960,7 @@
     </p:spTree>
     <p:extLst>
       <p:ext uri="{BB962C8B-B14F-4D97-AF65-F5344CB8AC3E}">
-        <p14:creationId xmlns:p14="http://schemas.microsoft.com/office/powerpoint/2010/main" val="2103938566"/>
+        <p14:creationId xmlns:p14="http://schemas.microsoft.com/office/powerpoint/2010/main" val="3484510625"/>
       </p:ext>
     </p:extLst>
   </p:cSld>
@@ -3978,12 +3987,40 @@
           <a:chExt cx="0" cy="0"/>
         </a:xfrm>
       </p:grpSpPr>
+      <p:sp>
+        <p:nvSpPr>
+          <p:cNvPr id="2" name="Title 1">
+            <a:extLst>
+              <a:ext uri="{FF2B5EF4-FFF2-40B4-BE49-F238E27FC236}">
+                <a16:creationId xmlns:a16="http://schemas.microsoft.com/office/drawing/2014/main" id="{E58807EB-5946-7BF8-335B-D5CEA25CFA03}"/>
+              </a:ext>
+            </a:extLst>
+          </p:cNvPr>
+          <p:cNvSpPr>
+            <a:spLocks noGrp="1"/>
+          </p:cNvSpPr>
+          <p:nvPr>
+            <p:ph type="title"/>
+          </p:nvPr>
+        </p:nvSpPr>
+        <p:spPr/>
+        <p:txBody>
+          <a:bodyPr/>
+          <a:lstStyle/>
+          <a:p>
+            <a:r>
+              <a:rPr lang="en-US" dirty="0"/>
+              <a:t>Total Accidents by Type</a:t>
+            </a:r>
+          </a:p>
+        </p:txBody>
+      </p:sp>
       <p:pic>
         <p:nvPicPr>
-          <p:cNvPr id="7" name="Picture 6" descr="A graph of accident type by a model&#10;&#10;Description automatically generated">
-            <a:extLst>
-              <a:ext uri="{FF2B5EF4-FFF2-40B4-BE49-F238E27FC236}">
-                <a16:creationId xmlns:a16="http://schemas.microsoft.com/office/drawing/2014/main" id="{771D2541-7117-6187-5F16-04CFAA1A59ED}"/>
+          <p:cNvPr id="5" name="Picture 4" descr="A graph of different colored lines&#10;&#10;Description automatically generated">
+            <a:extLst>
+              <a:ext uri="{FF2B5EF4-FFF2-40B4-BE49-F238E27FC236}">
+                <a16:creationId xmlns:a16="http://schemas.microsoft.com/office/drawing/2014/main" id="{D41B71DA-E43E-D4C0-8998-BF94E4E5AB85}"/>
               </a:ext>
             </a:extLst>
           </p:cNvPr>
@@ -4000,51 +4037,18 @@
         </p:blipFill>
         <p:spPr>
           <a:xfrm>
-            <a:off x="2501901" y="982471"/>
-            <a:ext cx="6887426" cy="5875529"/>
+            <a:off x="2454043" y="1279979"/>
+            <a:ext cx="6935284" cy="5578021"/>
           </a:xfrm>
           <a:prstGeom prst="rect">
             <a:avLst/>
           </a:prstGeom>
         </p:spPr>
       </p:pic>
-      <p:sp>
-        <p:nvSpPr>
-          <p:cNvPr id="2" name="Title 1">
-            <a:extLst>
-              <a:ext uri="{FF2B5EF4-FFF2-40B4-BE49-F238E27FC236}">
-                <a16:creationId xmlns:a16="http://schemas.microsoft.com/office/drawing/2014/main" id="{A6B4CDE3-42E3-7022-F9C8-463C5CBC9989}"/>
-              </a:ext>
-            </a:extLst>
-          </p:cNvPr>
-          <p:cNvSpPr>
-            <a:spLocks noGrp="1"/>
-          </p:cNvSpPr>
-          <p:nvPr>
-            <p:ph type="title"/>
-          </p:nvPr>
-        </p:nvSpPr>
-        <p:spPr>
-          <a:xfrm>
-            <a:off x="553999" y="186705"/>
-            <a:ext cx="10515600" cy="1325563"/>
-          </a:xfrm>
-        </p:spPr>
-        <p:txBody>
-          <a:bodyPr/>
-          <a:lstStyle/>
-          <a:p>
-            <a:r>
-              <a:rPr lang="en-US" dirty="0"/>
-              <a:t>Wide-Body Airplanes</a:t>
-            </a:r>
-          </a:p>
-        </p:txBody>
-      </p:sp>
     </p:spTree>
     <p:extLst>
       <p:ext uri="{BB962C8B-B14F-4D97-AF65-F5344CB8AC3E}">
-        <p14:creationId xmlns:p14="http://schemas.microsoft.com/office/powerpoint/2010/main" val="1038840234"/>
+        <p14:creationId xmlns:p14="http://schemas.microsoft.com/office/powerpoint/2010/main" val="3947855098"/>
       </p:ext>
     </p:extLst>
   </p:cSld>
@@ -4071,40 +4075,12 @@
           <a:chExt cx="0" cy="0"/>
         </a:xfrm>
       </p:grpSpPr>
-      <p:sp>
-        <p:nvSpPr>
-          <p:cNvPr id="2" name="Title 1">
-            <a:extLst>
-              <a:ext uri="{FF2B5EF4-FFF2-40B4-BE49-F238E27FC236}">
-                <a16:creationId xmlns:a16="http://schemas.microsoft.com/office/drawing/2014/main" id="{A6B4CDE3-42E3-7022-F9C8-463C5CBC9989}"/>
-              </a:ext>
-            </a:extLst>
-          </p:cNvPr>
-          <p:cNvSpPr>
-            <a:spLocks noGrp="1"/>
-          </p:cNvSpPr>
-          <p:nvPr>
-            <p:ph type="title"/>
-          </p:nvPr>
-        </p:nvSpPr>
-        <p:spPr/>
-        <p:txBody>
-          <a:bodyPr/>
-          <a:lstStyle/>
-          <a:p>
-            <a:r>
-              <a:rPr lang="en-US" dirty="0"/>
-              <a:t>Ratio</a:t>
-            </a:r>
-          </a:p>
-        </p:txBody>
-      </p:sp>
       <p:pic>
         <p:nvPicPr>
-          <p:cNvPr id="5" name="Picture 4" descr="A graph with text on it&#10;&#10;Description automatically generated">
-            <a:extLst>
-              <a:ext uri="{FF2B5EF4-FFF2-40B4-BE49-F238E27FC236}">
-                <a16:creationId xmlns:a16="http://schemas.microsoft.com/office/drawing/2014/main" id="{C25BA25A-DB4B-AB6B-BB03-37A3DDC16E43}"/>
+          <p:cNvPr id="7" name="Picture 6" descr="A graph of accident type by a model&#10;&#10;Description automatically generated">
+            <a:extLst>
+              <a:ext uri="{FF2B5EF4-FFF2-40B4-BE49-F238E27FC236}">
+                <a16:creationId xmlns:a16="http://schemas.microsoft.com/office/drawing/2014/main" id="{771D2541-7117-6187-5F16-04CFAA1A59ED}"/>
               </a:ext>
             </a:extLst>
           </p:cNvPr>
@@ -4121,8 +4097,134 @@
         </p:blipFill>
         <p:spPr>
           <a:xfrm>
-            <a:off x="2349500" y="1027906"/>
-            <a:ext cx="7493000" cy="5619750"/>
+            <a:off x="2501901" y="982471"/>
+            <a:ext cx="6887426" cy="5875529"/>
+          </a:xfrm>
+          <a:prstGeom prst="rect">
+            <a:avLst/>
+          </a:prstGeom>
+        </p:spPr>
+      </p:pic>
+      <p:sp>
+        <p:nvSpPr>
+          <p:cNvPr id="2" name="Title 1">
+            <a:extLst>
+              <a:ext uri="{FF2B5EF4-FFF2-40B4-BE49-F238E27FC236}">
+                <a16:creationId xmlns:a16="http://schemas.microsoft.com/office/drawing/2014/main" id="{A6B4CDE3-42E3-7022-F9C8-463C5CBC9989}"/>
+              </a:ext>
+            </a:extLst>
+          </p:cNvPr>
+          <p:cNvSpPr>
+            <a:spLocks noGrp="1"/>
+          </p:cNvSpPr>
+          <p:nvPr>
+            <p:ph type="title"/>
+          </p:nvPr>
+        </p:nvSpPr>
+        <p:spPr>
+          <a:xfrm>
+            <a:off x="553999" y="186705"/>
+            <a:ext cx="10515600" cy="1325563"/>
+          </a:xfrm>
+        </p:spPr>
+        <p:txBody>
+          <a:bodyPr/>
+          <a:lstStyle/>
+          <a:p>
+            <a:r>
+              <a:rPr lang="en-US" dirty="0"/>
+              <a:t>Wide-Body Airplanes</a:t>
+            </a:r>
+          </a:p>
+        </p:txBody>
+      </p:sp>
+    </p:spTree>
+    <p:extLst>
+      <p:ext uri="{BB962C8B-B14F-4D97-AF65-F5344CB8AC3E}">
+        <p14:creationId xmlns:p14="http://schemas.microsoft.com/office/powerpoint/2010/main" val="1038840234"/>
+      </p:ext>
+    </p:extLst>
+  </p:cSld>
+  <p:clrMapOvr>
+    <a:masterClrMapping/>
+  </p:clrMapOvr>
+</p:sld>
+</file>
+
+<file path=ppt/slides/slide6.xml><?xml version="1.0" encoding="utf-8"?>
+<p:sld xmlns:a="http://schemas.openxmlformats.org/drawingml/2006/main" xmlns:r="http://schemas.openxmlformats.org/officeDocument/2006/relationships" xmlns:p="http://schemas.openxmlformats.org/presentationml/2006/main">
+  <p:cSld>
+    <p:spTree>
+      <p:nvGrpSpPr>
+        <p:cNvPr id="1" name=""/>
+        <p:cNvGrpSpPr/>
+        <p:nvPr/>
+      </p:nvGrpSpPr>
+      <p:grpSpPr>
+        <a:xfrm>
+          <a:off x="0" y="0"/>
+          <a:ext cx="0" cy="0"/>
+          <a:chOff x="0" y="0"/>
+          <a:chExt cx="0" cy="0"/>
+        </a:xfrm>
+      </p:grpSpPr>
+      <p:sp>
+        <p:nvSpPr>
+          <p:cNvPr id="2" name="Title 1">
+            <a:extLst>
+              <a:ext uri="{FF2B5EF4-FFF2-40B4-BE49-F238E27FC236}">
+                <a16:creationId xmlns:a16="http://schemas.microsoft.com/office/drawing/2014/main" id="{0361E87C-75B5-9481-72D7-BF262DBD1A81}"/>
+              </a:ext>
+            </a:extLst>
+          </p:cNvPr>
+          <p:cNvSpPr>
+            <a:spLocks noGrp="1"/>
+          </p:cNvSpPr>
+          <p:nvPr>
+            <p:ph type="title"/>
+          </p:nvPr>
+        </p:nvSpPr>
+        <p:spPr>
+          <a:xfrm>
+            <a:off x="793596" y="209011"/>
+            <a:ext cx="10515600" cy="1325563"/>
+          </a:xfrm>
+        </p:spPr>
+        <p:txBody>
+          <a:bodyPr/>
+          <a:lstStyle/>
+          <a:p>
+            <a:r>
+              <a:rPr lang="en-US" dirty="0"/>
+              <a:t>Narrow-Body Airplanes</a:t>
+            </a:r>
+          </a:p>
+        </p:txBody>
+      </p:sp>
+      <p:pic>
+        <p:nvPicPr>
+          <p:cNvPr id="5" name="Picture 4" descr="A graph of accident type&#10;&#10;Description automatically generated">
+            <a:extLst>
+              <a:ext uri="{FF2B5EF4-FFF2-40B4-BE49-F238E27FC236}">
+                <a16:creationId xmlns:a16="http://schemas.microsoft.com/office/drawing/2014/main" id="{A3216EA0-BE6A-9636-8F67-3FE5BB94A640}"/>
+              </a:ext>
+            </a:extLst>
+          </p:cNvPr>
+          <p:cNvPicPr>
+            <a:picLocks noChangeAspect="1"/>
+          </p:cNvPicPr>
+          <p:nvPr/>
+        </p:nvPicPr>
+        <p:blipFill>
+          <a:blip r:embed="rId2"/>
+          <a:stretch>
+            <a:fillRect/>
+          </a:stretch>
+        </p:blipFill>
+        <p:spPr>
+          <a:xfrm>
+            <a:off x="2644899" y="1092820"/>
+            <a:ext cx="6902202" cy="5765180"/>
           </a:xfrm>
           <a:prstGeom prst="rect">
             <a:avLst/>
@@ -4132,7 +4234,183 @@
     </p:spTree>
     <p:extLst>
       <p:ext uri="{BB962C8B-B14F-4D97-AF65-F5344CB8AC3E}">
-        <p14:creationId xmlns:p14="http://schemas.microsoft.com/office/powerpoint/2010/main" val="1428409811"/>
+        <p14:creationId xmlns:p14="http://schemas.microsoft.com/office/powerpoint/2010/main" val="3824167703"/>
+      </p:ext>
+    </p:extLst>
+  </p:cSld>
+  <p:clrMapOvr>
+    <a:masterClrMapping/>
+  </p:clrMapOvr>
+</p:sld>
+</file>
+
+<file path=ppt/slides/slide7.xml><?xml version="1.0" encoding="utf-8"?>
+<p:sld xmlns:a="http://schemas.openxmlformats.org/drawingml/2006/main" xmlns:r="http://schemas.openxmlformats.org/officeDocument/2006/relationships" xmlns:p="http://schemas.openxmlformats.org/presentationml/2006/main">
+  <p:cSld>
+    <p:spTree>
+      <p:nvGrpSpPr>
+        <p:cNvPr id="1" name=""/>
+        <p:cNvGrpSpPr/>
+        <p:nvPr/>
+      </p:nvGrpSpPr>
+      <p:grpSpPr>
+        <a:xfrm>
+          <a:off x="0" y="0"/>
+          <a:ext cx="0" cy="0"/>
+          <a:chOff x="0" y="0"/>
+          <a:chExt cx="0" cy="0"/>
+        </a:xfrm>
+      </p:grpSpPr>
+      <p:sp>
+        <p:nvSpPr>
+          <p:cNvPr id="2" name="Title 1">
+            <a:extLst>
+              <a:ext uri="{FF2B5EF4-FFF2-40B4-BE49-F238E27FC236}">
+                <a16:creationId xmlns:a16="http://schemas.microsoft.com/office/drawing/2014/main" id="{0361E87C-75B5-9481-72D7-BF262DBD1A81}"/>
+              </a:ext>
+            </a:extLst>
+          </p:cNvPr>
+          <p:cNvSpPr>
+            <a:spLocks noGrp="1"/>
+          </p:cNvSpPr>
+          <p:nvPr>
+            <p:ph type="title"/>
+          </p:nvPr>
+        </p:nvSpPr>
+        <p:spPr>
+          <a:xfrm>
+            <a:off x="793596" y="209011"/>
+            <a:ext cx="10515600" cy="1325563"/>
+          </a:xfrm>
+        </p:spPr>
+        <p:txBody>
+          <a:bodyPr/>
+          <a:lstStyle/>
+          <a:p>
+            <a:r>
+              <a:rPr lang="en-US" dirty="0"/>
+              <a:t>Business Jet</a:t>
+            </a:r>
+          </a:p>
+        </p:txBody>
+      </p:sp>
+      <p:pic>
+        <p:nvPicPr>
+          <p:cNvPr id="4" name="Picture 3" descr="A graph of a plane crash type&#10;&#10;Description automatically generated">
+            <a:extLst>
+              <a:ext uri="{FF2B5EF4-FFF2-40B4-BE49-F238E27FC236}">
+                <a16:creationId xmlns:a16="http://schemas.microsoft.com/office/drawing/2014/main" id="{02105B72-5796-99CD-EDD9-E890F37CCD0A}"/>
+              </a:ext>
+            </a:extLst>
+          </p:cNvPr>
+          <p:cNvPicPr>
+            <a:picLocks noChangeAspect="1"/>
+          </p:cNvPicPr>
+          <p:nvPr/>
+        </p:nvPicPr>
+        <p:blipFill>
+          <a:blip r:embed="rId2"/>
+          <a:stretch>
+            <a:fillRect/>
+          </a:stretch>
+        </p:blipFill>
+        <p:spPr>
+          <a:xfrm>
+            <a:off x="2753541" y="1048215"/>
+            <a:ext cx="6872146" cy="5809785"/>
+          </a:xfrm>
+          <a:prstGeom prst="rect">
+            <a:avLst/>
+          </a:prstGeom>
+        </p:spPr>
+      </p:pic>
+    </p:spTree>
+    <p:extLst>
+      <p:ext uri="{BB962C8B-B14F-4D97-AF65-F5344CB8AC3E}">
+        <p14:creationId xmlns:p14="http://schemas.microsoft.com/office/powerpoint/2010/main" val="1114078506"/>
+      </p:ext>
+    </p:extLst>
+  </p:cSld>
+  <p:clrMapOvr>
+    <a:masterClrMapping/>
+  </p:clrMapOvr>
+</p:sld>
+</file>
+
+<file path=ppt/slides/slide8.xml><?xml version="1.0" encoding="utf-8"?>
+<p:sld xmlns:a="http://schemas.openxmlformats.org/drawingml/2006/main" xmlns:r="http://schemas.openxmlformats.org/officeDocument/2006/relationships" xmlns:p="http://schemas.openxmlformats.org/presentationml/2006/main">
+  <p:cSld>
+    <p:spTree>
+      <p:nvGrpSpPr>
+        <p:cNvPr id="1" name=""/>
+        <p:cNvGrpSpPr/>
+        <p:nvPr/>
+      </p:nvGrpSpPr>
+      <p:grpSpPr>
+        <a:xfrm>
+          <a:off x="0" y="0"/>
+          <a:ext cx="0" cy="0"/>
+          <a:chOff x="0" y="0"/>
+          <a:chExt cx="0" cy="0"/>
+        </a:xfrm>
+      </p:grpSpPr>
+      <p:sp>
+        <p:nvSpPr>
+          <p:cNvPr id="2" name="Title 1">
+            <a:extLst>
+              <a:ext uri="{FF2B5EF4-FFF2-40B4-BE49-F238E27FC236}">
+                <a16:creationId xmlns:a16="http://schemas.microsoft.com/office/drawing/2014/main" id="{4AC6FD48-755F-11C3-3C74-2B5D30C2841D}"/>
+              </a:ext>
+            </a:extLst>
+          </p:cNvPr>
+          <p:cNvSpPr>
+            <a:spLocks noGrp="1"/>
+          </p:cNvSpPr>
+          <p:nvPr>
+            <p:ph type="title"/>
+          </p:nvPr>
+        </p:nvSpPr>
+        <p:spPr/>
+        <p:txBody>
+          <a:bodyPr/>
+          <a:lstStyle/>
+          <a:p>
+            <a:r>
+              <a:rPr lang="en-US" dirty="0"/>
+              <a:t>Recommendations</a:t>
+            </a:r>
+          </a:p>
+        </p:txBody>
+      </p:sp>
+      <p:sp>
+        <p:nvSpPr>
+          <p:cNvPr id="3" name="Content Placeholder 2">
+            <a:extLst>
+              <a:ext uri="{FF2B5EF4-FFF2-40B4-BE49-F238E27FC236}">
+                <a16:creationId xmlns:a16="http://schemas.microsoft.com/office/drawing/2014/main" id="{7787F3D1-D7F6-B967-B76E-2B68718AECBF}"/>
+              </a:ext>
+            </a:extLst>
+          </p:cNvPr>
+          <p:cNvSpPr>
+            <a:spLocks noGrp="1"/>
+          </p:cNvSpPr>
+          <p:nvPr>
+            <p:ph idx="1"/>
+          </p:nvPr>
+        </p:nvSpPr>
+        <p:spPr/>
+        <p:txBody>
+          <a:bodyPr/>
+          <a:lstStyle/>
+          <a:p>
+            <a:endParaRPr lang="en-US"/>
+          </a:p>
+        </p:txBody>
+      </p:sp>
+    </p:spTree>
+    <p:extLst>
+      <p:ext uri="{BB962C8B-B14F-4D97-AF65-F5344CB8AC3E}">
+        <p14:creationId xmlns:p14="http://schemas.microsoft.com/office/powerpoint/2010/main" val="3985090315"/>
       </p:ext>
     </p:extLst>
   </p:cSld>

</xml_diff>

<commit_message>
added images file to repository
</commit_message>
<xml_diff>
--- a/Presentation.pptx
+++ b/Presentation.pptx
@@ -13,6 +13,7 @@
     <p:sldId id="264" r:id="rId7"/>
     <p:sldId id="265" r:id="rId8"/>
     <p:sldId id="266" r:id="rId9"/>
+    <p:sldId id="267" r:id="rId10"/>
   </p:sldIdLst>
   <p:sldSz cx="12192000" cy="6858000"/>
   <p:notesSz cx="6858000" cy="9144000"/>
@@ -3356,7 +3357,7 @@
           <a:p>
             <a:r>
               <a:rPr lang="en-US" dirty="0"/>
-              <a:t>NTSB Accident Review</a:t>
+              <a:t>Airplane Safety Review</a:t>
             </a:r>
           </a:p>
         </p:txBody>
@@ -3382,7 +3383,10 @@
           <a:bodyPr/>
           <a:lstStyle/>
           <a:p>
-            <a:endParaRPr lang="en-US"/>
+            <a:r>
+              <a:rPr lang="en-US" dirty="0"/>
+              <a:t>NTSB Accident Database</a:t>
+            </a:r>
           </a:p>
         </p:txBody>
       </p:sp>
@@ -3439,7 +3443,7 @@
           <a:p>
             <a:r>
               <a:rPr lang="en-US" dirty="0"/>
-              <a:t>Steps</a:t>
+              <a:t>Safety Review of Aircraft</a:t>
             </a:r>
           </a:p>
         </p:txBody>
@@ -3467,7 +3471,7 @@
           <a:p>
             <a:r>
               <a:rPr lang="en-US" dirty="0"/>
-              <a:t>Select aircraft type to purchase</a:t>
+              <a:t>Accident Data by Type of Airplane</a:t>
             </a:r>
           </a:p>
           <a:p>
@@ -3494,7 +3498,7 @@
           <a:p>
             <a:r>
               <a:rPr lang="en-US" dirty="0"/>
-              <a:t>Select an aircraft model to purchase</a:t>
+              <a:t>Accident Data by Model</a:t>
             </a:r>
           </a:p>
         </p:txBody>
@@ -3552,7 +3556,7 @@
           <a:p>
             <a:r>
               <a:rPr lang="en-US" dirty="0"/>
-              <a:t>Total Accidents by Type</a:t>
+              <a:t>Accidents by Aircraft Type</a:t>
             </a:r>
           </a:p>
         </p:txBody>
@@ -3956,7 +3960,7 @@
           <a:p>
             <a:r>
               <a:rPr lang="en-US" dirty="0"/>
-              <a:t>Wide-Body or Business Jet</a:t>
+              <a:t>Wide-Body</a:t>
             </a:r>
           </a:p>
           <a:p>
@@ -3972,6 +3976,12 @@
             <a:r>
               <a:rPr lang="en-US" dirty="0"/>
               <a:t>Wide-Body: Airbus A350 </a:t>
+            </a:r>
+          </a:p>
+          <a:p>
+            <a:r>
+              <a:rPr lang="en-US" dirty="0"/>
+              <a:t>Narrow-Body: A220</a:t>
             </a:r>
           </a:p>
           <a:p>
@@ -4073,6 +4083,12 @@
             </a:r>
           </a:p>
           <a:p>
+            <a:r>
+              <a:rPr lang="en-US" dirty="0"/>
+              <a:t>Account for accident causes</a:t>
+            </a:r>
+          </a:p>
+          <a:p>
             <a:pPr marL="0" indent="0">
               <a:buNone/>
             </a:pPr>
@@ -4084,6 +4100,89 @@
     <p:extLst>
       <p:ext uri="{BB962C8B-B14F-4D97-AF65-F5344CB8AC3E}">
         <p14:creationId xmlns:p14="http://schemas.microsoft.com/office/powerpoint/2010/main" val="3698387558"/>
+      </p:ext>
+    </p:extLst>
+  </p:cSld>
+  <p:clrMapOvr>
+    <a:masterClrMapping/>
+  </p:clrMapOvr>
+</p:sld>
+</file>
+
+<file path=ppt/slides/slide9.xml><?xml version="1.0" encoding="utf-8"?>
+<p:sld xmlns:a="http://schemas.openxmlformats.org/drawingml/2006/main" xmlns:r="http://schemas.openxmlformats.org/officeDocument/2006/relationships" xmlns:p="http://schemas.openxmlformats.org/presentationml/2006/main">
+  <p:cSld>
+    <p:spTree>
+      <p:nvGrpSpPr>
+        <p:cNvPr id="1" name=""/>
+        <p:cNvGrpSpPr/>
+        <p:nvPr/>
+      </p:nvGrpSpPr>
+      <p:grpSpPr>
+        <a:xfrm>
+          <a:off x="0" y="0"/>
+          <a:ext cx="0" cy="0"/>
+          <a:chOff x="0" y="0"/>
+          <a:chExt cx="0" cy="0"/>
+        </a:xfrm>
+      </p:grpSpPr>
+      <p:sp>
+        <p:nvSpPr>
+          <p:cNvPr id="2" name="Title 1">
+            <a:extLst>
+              <a:ext uri="{FF2B5EF4-FFF2-40B4-BE49-F238E27FC236}">
+                <a16:creationId xmlns:a16="http://schemas.microsoft.com/office/drawing/2014/main" id="{615D71D1-21E1-F564-713C-510977F2C3F1}"/>
+              </a:ext>
+            </a:extLst>
+          </p:cNvPr>
+          <p:cNvSpPr>
+            <a:spLocks noGrp="1"/>
+          </p:cNvSpPr>
+          <p:nvPr>
+            <p:ph type="title"/>
+          </p:nvPr>
+        </p:nvSpPr>
+        <p:spPr/>
+        <p:txBody>
+          <a:bodyPr/>
+          <a:lstStyle/>
+          <a:p>
+            <a:r>
+              <a:rPr lang="en-US" dirty="0"/>
+              <a:t>Questions?</a:t>
+            </a:r>
+          </a:p>
+        </p:txBody>
+      </p:sp>
+      <p:sp>
+        <p:nvSpPr>
+          <p:cNvPr id="3" name="Content Placeholder 2">
+            <a:extLst>
+              <a:ext uri="{FF2B5EF4-FFF2-40B4-BE49-F238E27FC236}">
+                <a16:creationId xmlns:a16="http://schemas.microsoft.com/office/drawing/2014/main" id="{FEE09697-B065-BF6A-333A-EA43BF64FF5B}"/>
+              </a:ext>
+            </a:extLst>
+          </p:cNvPr>
+          <p:cNvSpPr>
+            <a:spLocks noGrp="1"/>
+          </p:cNvSpPr>
+          <p:nvPr>
+            <p:ph idx="1"/>
+          </p:nvPr>
+        </p:nvSpPr>
+        <p:spPr/>
+        <p:txBody>
+          <a:bodyPr/>
+          <a:lstStyle/>
+          <a:p>
+            <a:endParaRPr lang="en-US"/>
+          </a:p>
+        </p:txBody>
+      </p:sp>
+    </p:spTree>
+    <p:extLst>
+      <p:ext uri="{BB962C8B-B14F-4D97-AF65-F5344CB8AC3E}">
+        <p14:creationId xmlns:p14="http://schemas.microsoft.com/office/powerpoint/2010/main" val="530098243"/>
       </p:ext>
     </p:extLst>
   </p:cSld>

</xml_diff>

<commit_message>
Updated code for data preparation and visualizations
</commit_message>
<xml_diff>
--- a/Presentation.pptx
+++ b/Presentation.pptx
@@ -267,7 +267,7 @@
           <a:p>
             <a:fld id="{605268DD-0BB1-4344-A33E-E0EAAC7A1E72}" type="datetimeFigureOut">
               <a:rPr lang="en-US" smtClean="0"/>
-              <a:t>7/15/24</a:t>
+              <a:t>7/17/24</a:t>
             </a:fld>
             <a:endParaRPr lang="en-US"/>
           </a:p>
@@ -465,7 +465,7 @@
           <a:p>
             <a:fld id="{605268DD-0BB1-4344-A33E-E0EAAC7A1E72}" type="datetimeFigureOut">
               <a:rPr lang="en-US" smtClean="0"/>
-              <a:t>7/15/24</a:t>
+              <a:t>7/17/24</a:t>
             </a:fld>
             <a:endParaRPr lang="en-US"/>
           </a:p>
@@ -673,7 +673,7 @@
           <a:p>
             <a:fld id="{605268DD-0BB1-4344-A33E-E0EAAC7A1E72}" type="datetimeFigureOut">
               <a:rPr lang="en-US" smtClean="0"/>
-              <a:t>7/15/24</a:t>
+              <a:t>7/17/24</a:t>
             </a:fld>
             <a:endParaRPr lang="en-US"/>
           </a:p>
@@ -871,7 +871,7 @@
           <a:p>
             <a:fld id="{605268DD-0BB1-4344-A33E-E0EAAC7A1E72}" type="datetimeFigureOut">
               <a:rPr lang="en-US" smtClean="0"/>
-              <a:t>7/15/24</a:t>
+              <a:t>7/17/24</a:t>
             </a:fld>
             <a:endParaRPr lang="en-US"/>
           </a:p>
@@ -1146,7 +1146,7 @@
           <a:p>
             <a:fld id="{605268DD-0BB1-4344-A33E-E0EAAC7A1E72}" type="datetimeFigureOut">
               <a:rPr lang="en-US" smtClean="0"/>
-              <a:t>7/15/24</a:t>
+              <a:t>7/17/24</a:t>
             </a:fld>
             <a:endParaRPr lang="en-US"/>
           </a:p>
@@ -1411,7 +1411,7 @@
           <a:p>
             <a:fld id="{605268DD-0BB1-4344-A33E-E0EAAC7A1E72}" type="datetimeFigureOut">
               <a:rPr lang="en-US" smtClean="0"/>
-              <a:t>7/15/24</a:t>
+              <a:t>7/17/24</a:t>
             </a:fld>
             <a:endParaRPr lang="en-US"/>
           </a:p>
@@ -1823,7 +1823,7 @@
           <a:p>
             <a:fld id="{605268DD-0BB1-4344-A33E-E0EAAC7A1E72}" type="datetimeFigureOut">
               <a:rPr lang="en-US" smtClean="0"/>
-              <a:t>7/15/24</a:t>
+              <a:t>7/17/24</a:t>
             </a:fld>
             <a:endParaRPr lang="en-US"/>
           </a:p>
@@ -1964,7 +1964,7 @@
           <a:p>
             <a:fld id="{605268DD-0BB1-4344-A33E-E0EAAC7A1E72}" type="datetimeFigureOut">
               <a:rPr lang="en-US" smtClean="0"/>
-              <a:t>7/15/24</a:t>
+              <a:t>7/17/24</a:t>
             </a:fld>
             <a:endParaRPr lang="en-US"/>
           </a:p>
@@ -2077,7 +2077,7 @@
           <a:p>
             <a:fld id="{605268DD-0BB1-4344-A33E-E0EAAC7A1E72}" type="datetimeFigureOut">
               <a:rPr lang="en-US" smtClean="0"/>
-              <a:t>7/15/24</a:t>
+              <a:t>7/17/24</a:t>
             </a:fld>
             <a:endParaRPr lang="en-US"/>
           </a:p>
@@ -2388,7 +2388,7 @@
           <a:p>
             <a:fld id="{605268DD-0BB1-4344-A33E-E0EAAC7A1E72}" type="datetimeFigureOut">
               <a:rPr lang="en-US" smtClean="0"/>
-              <a:t>7/15/24</a:t>
+              <a:t>7/17/24</a:t>
             </a:fld>
             <a:endParaRPr lang="en-US"/>
           </a:p>
@@ -2676,7 +2676,7 @@
           <a:p>
             <a:fld id="{605268DD-0BB1-4344-A33E-E0EAAC7A1E72}" type="datetimeFigureOut">
               <a:rPr lang="en-US" smtClean="0"/>
-              <a:t>7/15/24</a:t>
+              <a:t>7/17/24</a:t>
             </a:fld>
             <a:endParaRPr lang="en-US"/>
           </a:p>
@@ -2917,7 +2917,7 @@
           <a:p>
             <a:fld id="{605268DD-0BB1-4344-A33E-E0EAAC7A1E72}" type="datetimeFigureOut">
               <a:rPr lang="en-US" smtClean="0"/>
-              <a:t>7/15/24</a:t>
+              <a:t>7/17/24</a:t>
             </a:fld>
             <a:endParaRPr lang="en-US"/>
           </a:p>
@@ -3556,7 +3556,7 @@
           <a:p>
             <a:r>
               <a:rPr lang="en-US" dirty="0"/>
-              <a:t>Accidents by Aircraft Type</a:t>
+              <a:t>Accidents vs. Time by Aircraft Type</a:t>
             </a:r>
           </a:p>
         </p:txBody>
@@ -4072,8 +4072,12 @@
           <a:lstStyle/>
           <a:p>
             <a:r>
+              <a:rPr lang="en-US"/>
+              <a:t>Control for </a:t>
+            </a:r>
+            <a:r>
               <a:rPr lang="en-US" dirty="0"/>
-              <a:t>Control for different numbers of planes in field</a:t>
+              <a:t>different numbers of planes in field</a:t>
             </a:r>
           </a:p>
           <a:p>

</xml_diff>